<commit_message>
Slides are wrapped up
</commit_message>
<xml_diff>
--- a/optimization-methods-for-artificial-intelligence/ml-decision-trees-ensembles.pptx
+++ b/optimization-methods-for-artificial-intelligence/ml-decision-trees-ensembles.pptx
@@ -18,7 +18,8 @@
     <p:sldId id="266" r:id="rId12"/>
     <p:sldId id="268" r:id="rId13"/>
     <p:sldId id="269" r:id="rId14"/>
-    <p:sldId id="270" r:id="rId15"/>
+    <p:sldId id="271" r:id="rId15"/>
+    <p:sldId id="270" r:id="rId16"/>
   </p:sldIdLst>
   <p:sldSz cx="12192000" cy="6858000"/>
   <p:notesSz cx="6858000" cy="9144000"/>
@@ -2209,6 +2210,77 @@
             </a:r>
           </a:p>
           <a:p>
+            <a:pPr lvl="1"/>
+            <a:r>
+              <a:rPr lang="en-US" dirty="0"/>
+              <a:t>Set a same weight for all samples in training set</a:t>
+            </a:r>
+          </a:p>
+          <a:p>
+            <a:pPr lvl="1"/>
+            <a:r>
+              <a:rPr lang="en-US" dirty="0"/>
+              <a:t>Creates first tree using all the training data</a:t>
+            </a:r>
+          </a:p>
+          <a:p>
+            <a:pPr lvl="1"/>
+            <a:r>
+              <a:rPr lang="en-US" dirty="0"/>
+              <a:t>Then, evaluates performance</a:t>
+            </a:r>
+          </a:p>
+          <a:p>
+            <a:pPr lvl="1"/>
+            <a:r>
+              <a:rPr lang="en-US" dirty="0"/>
+              <a:t>Increases weight of samples where first tree performed badly</a:t>
+            </a:r>
+          </a:p>
+          <a:p>
+            <a:pPr lvl="1"/>
+            <a:r>
+              <a:rPr lang="en-US" dirty="0"/>
+              <a:t>Lowers weight of samples where first tree performed well</a:t>
+            </a:r>
+          </a:p>
+          <a:p>
+            <a:pPr lvl="1"/>
+            <a:r>
+              <a:rPr lang="en-US" dirty="0"/>
+              <a:t>Creates a new tree, using new weights</a:t>
+            </a:r>
+          </a:p>
+          <a:p>
+            <a:pPr lvl="1"/>
+            <a:r>
+              <a:rPr lang="en-US" dirty="0"/>
+              <a:t>Evaluates </a:t>
+            </a:r>
+            <a:r>
+              <a:rPr lang="en-US" dirty="0" err="1"/>
+              <a:t>first+second</a:t>
+            </a:r>
+            <a:r>
+              <a:rPr lang="en-US" dirty="0"/>
+              <a:t> tree</a:t>
+            </a:r>
+          </a:p>
+          <a:p>
+            <a:pPr lvl="1"/>
+            <a:r>
+              <a:rPr lang="en-US" dirty="0"/>
+              <a:t>Alters the weights depending on performance</a:t>
+            </a:r>
+          </a:p>
+          <a:p>
+            <a:pPr lvl="1"/>
+            <a:r>
+              <a:rPr lang="en-US" dirty="0"/>
+              <a:t>Creates a third tree…</a:t>
+            </a:r>
+          </a:p>
+          <a:p>
             <a:endParaRPr lang="en-US" dirty="0"/>
           </a:p>
         </p:txBody>
@@ -2227,6 +2299,285 @@
 </file>
 
 <file path=ppt/slides/slide14.xml><?xml version="1.0" encoding="utf-8"?>
+<p:sld xmlns:a="http://schemas.openxmlformats.org/drawingml/2006/main" xmlns:r="http://schemas.openxmlformats.org/officeDocument/2006/relationships" xmlns:p="http://schemas.openxmlformats.org/presentationml/2006/main">
+  <p:cSld>
+    <p:spTree>
+      <p:nvGrpSpPr>
+        <p:cNvPr id="1" name=""/>
+        <p:cNvGrpSpPr/>
+        <p:nvPr/>
+      </p:nvGrpSpPr>
+      <p:grpSpPr>
+        <a:xfrm>
+          <a:off x="0" y="0"/>
+          <a:ext cx="0" cy="0"/>
+          <a:chOff x="0" y="0"/>
+          <a:chExt cx="0" cy="0"/>
+        </a:xfrm>
+      </p:grpSpPr>
+      <p:sp>
+        <p:nvSpPr>
+          <p:cNvPr id="2" name="Titre 1">
+            <a:extLst>
+              <a:ext uri="{FF2B5EF4-FFF2-40B4-BE49-F238E27FC236}">
+                <a16:creationId xmlns:a16="http://schemas.microsoft.com/office/drawing/2014/main" id="{8A599CE3-D117-45A3-991C-EB63727375E8}"/>
+              </a:ext>
+            </a:extLst>
+          </p:cNvPr>
+          <p:cNvSpPr>
+            <a:spLocks noGrp="1"/>
+          </p:cNvSpPr>
+          <p:nvPr>
+            <p:ph type="title"/>
+          </p:nvPr>
+        </p:nvSpPr>
+        <p:spPr/>
+        <p:txBody>
+          <a:bodyPr/>
+          <a:lstStyle/>
+          <a:p>
+            <a:r>
+              <a:rPr lang="en-US" dirty="0"/>
+              <a:t>Ensembles</a:t>
+            </a:r>
+          </a:p>
+        </p:txBody>
+      </p:sp>
+      <p:sp>
+        <p:nvSpPr>
+          <p:cNvPr id="3" name="Espace réservé du texte 2">
+            <a:extLst>
+              <a:ext uri="{FF2B5EF4-FFF2-40B4-BE49-F238E27FC236}">
+                <a16:creationId xmlns:a16="http://schemas.microsoft.com/office/drawing/2014/main" id="{B2951432-CAA0-46EB-8526-2849518C2799}"/>
+              </a:ext>
+            </a:extLst>
+          </p:cNvPr>
+          <p:cNvSpPr>
+            <a:spLocks noGrp="1"/>
+          </p:cNvSpPr>
+          <p:nvPr>
+            <p:ph type="body" sz="quarter" idx="10"/>
+          </p:nvPr>
+        </p:nvSpPr>
+        <p:spPr/>
+        <p:txBody>
+          <a:bodyPr/>
+          <a:lstStyle/>
+          <a:p>
+            <a:r>
+              <a:rPr lang="en-US" dirty="0"/>
+              <a:t>In practice, ensembles perform well on </a:t>
+            </a:r>
+            <a:r>
+              <a:rPr lang="en-US" b="1" dirty="0"/>
+              <a:t>tabular data</a:t>
+            </a:r>
+          </a:p>
+          <a:p>
+            <a:r>
+              <a:rPr lang="en-US" dirty="0"/>
+              <a:t>Win most Kaggle challenges</a:t>
+            </a:r>
+          </a:p>
+          <a:p>
+            <a:r>
+              <a:rPr lang="en-US" dirty="0"/>
+              <a:t>Between a few and a lot of hyperparameters</a:t>
+            </a:r>
+          </a:p>
+        </p:txBody>
+      </p:sp>
+      <p:pic>
+        <p:nvPicPr>
+          <p:cNvPr id="4" name="Picture 2" descr="Risultati immagini per apes together strong">
+            <a:extLst>
+              <a:ext uri="{FF2B5EF4-FFF2-40B4-BE49-F238E27FC236}">
+                <a16:creationId xmlns:a16="http://schemas.microsoft.com/office/drawing/2014/main" id="{A4E056BB-8D90-4F13-BA82-B17AC4A7F702}"/>
+              </a:ext>
+            </a:extLst>
+          </p:cNvPr>
+          <p:cNvPicPr>
+            <a:picLocks noChangeAspect="1" noChangeArrowheads="1"/>
+          </p:cNvPicPr>
+          <p:nvPr/>
+        </p:nvPicPr>
+        <p:blipFill>
+          <a:blip r:embed="rId2" cstate="print">
+            <a:extLst>
+              <a:ext uri="{28A0092B-C50C-407E-A947-70E740481C1C}">
+                <a14:useLocalDpi xmlns:a14="http://schemas.microsoft.com/office/drawing/2010/main" val="0"/>
+              </a:ext>
+            </a:extLst>
+          </a:blip>
+          <a:srcRect/>
+          <a:stretch>
+            <a:fillRect/>
+          </a:stretch>
+        </p:blipFill>
+        <p:spPr bwMode="auto">
+          <a:xfrm>
+            <a:off x="6313487" y="3346603"/>
+            <a:ext cx="4289425" cy="2752572"/>
+          </a:xfrm>
+          <a:prstGeom prst="rect">
+            <a:avLst/>
+          </a:prstGeom>
+          <a:noFill/>
+          <a:extLst>
+            <a:ext uri="{909E8E84-426E-40DD-AFC4-6F175D3DCCD1}">
+              <a14:hiddenFill xmlns:a14="http://schemas.microsoft.com/office/drawing/2010/main">
+                <a:solidFill>
+                  <a:srgbClr val="FFFFFF"/>
+                </a:solidFill>
+              </a14:hiddenFill>
+            </a:ext>
+          </a:extLst>
+        </p:spPr>
+      </p:pic>
+      <p:cxnSp>
+        <p:nvCxnSpPr>
+          <p:cNvPr id="5" name="Connecteur droit 4">
+            <a:extLst>
+              <a:ext uri="{FF2B5EF4-FFF2-40B4-BE49-F238E27FC236}">
+                <a16:creationId xmlns:a16="http://schemas.microsoft.com/office/drawing/2014/main" id="{07D1940F-FF11-4F77-B420-64FA46179B4C}"/>
+              </a:ext>
+            </a:extLst>
+          </p:cNvPr>
+          <p:cNvCxnSpPr/>
+          <p:nvPr/>
+        </p:nvCxnSpPr>
+        <p:spPr>
+          <a:xfrm>
+            <a:off x="7227887" y="5733732"/>
+            <a:ext cx="533400" cy="0"/>
+          </a:xfrm>
+          <a:prstGeom prst="line">
+            <a:avLst/>
+          </a:prstGeom>
+          <a:ln w="28575">
+            <a:solidFill>
+              <a:schemeClr val="bg1"/>
+            </a:solidFill>
+          </a:ln>
+        </p:spPr>
+        <p:style>
+          <a:lnRef idx="1">
+            <a:schemeClr val="accent1"/>
+          </a:lnRef>
+          <a:fillRef idx="0">
+            <a:schemeClr val="accent1"/>
+          </a:fillRef>
+          <a:effectRef idx="0">
+            <a:schemeClr val="accent1"/>
+          </a:effectRef>
+          <a:fontRef idx="minor">
+            <a:schemeClr val="tx1"/>
+          </a:fontRef>
+        </p:style>
+      </p:cxnSp>
+      <p:sp>
+        <p:nvSpPr>
+          <p:cNvPr id="6" name="ZoneTexte 5">
+            <a:extLst>
+              <a:ext uri="{FF2B5EF4-FFF2-40B4-BE49-F238E27FC236}">
+                <a16:creationId xmlns:a16="http://schemas.microsoft.com/office/drawing/2014/main" id="{D8E8471B-7839-41E9-B908-333F897CF683}"/>
+              </a:ext>
+            </a:extLst>
+          </p:cNvPr>
+          <p:cNvSpPr txBox="1"/>
+          <p:nvPr/>
+        </p:nvSpPr>
+        <p:spPr>
+          <a:xfrm>
+            <a:off x="6313487" y="5347216"/>
+            <a:ext cx="2209800" cy="369332"/>
+          </a:xfrm>
+          <a:prstGeom prst="rect">
+            <a:avLst/>
+          </a:prstGeom>
+          <a:noFill/>
+        </p:spPr>
+        <p:txBody>
+          <a:bodyPr wrap="square" rtlCol="0">
+            <a:spAutoFit/>
+          </a:bodyPr>
+          <a:lstStyle/>
+          <a:p>
+            <a:r>
+              <a:rPr lang="it-IT" dirty="0">
+                <a:solidFill>
+                  <a:schemeClr val="bg1"/>
+                </a:solidFill>
+              </a:rPr>
+              <a:t>Weak predictors</a:t>
+            </a:r>
+            <a:endParaRPr lang="fr-FR" dirty="0">
+              <a:solidFill>
+                <a:schemeClr val="bg1"/>
+              </a:solidFill>
+            </a:endParaRPr>
+          </a:p>
+        </p:txBody>
+      </p:sp>
+      <p:pic>
+        <p:nvPicPr>
+          <p:cNvPr id="7" name="Picture 2" descr="Risultati immagini per kaggle">
+            <a:extLst>
+              <a:ext uri="{FF2B5EF4-FFF2-40B4-BE49-F238E27FC236}">
+                <a16:creationId xmlns:a16="http://schemas.microsoft.com/office/drawing/2014/main" id="{D1C11A33-360E-4DAA-94D5-8DDD39370DE7}"/>
+              </a:ext>
+            </a:extLst>
+          </p:cNvPr>
+          <p:cNvPicPr>
+            <a:picLocks noChangeAspect="1" noChangeArrowheads="1"/>
+          </p:cNvPicPr>
+          <p:nvPr/>
+        </p:nvPicPr>
+        <p:blipFill rotWithShape="1">
+          <a:blip r:embed="rId3">
+            <a:extLst>
+              <a:ext uri="{28A0092B-C50C-407E-A947-70E740481C1C}">
+                <a14:useLocalDpi xmlns:a14="http://schemas.microsoft.com/office/drawing/2010/main" val="0"/>
+              </a:ext>
+            </a:extLst>
+          </a:blip>
+          <a:srcRect l="19467" r="20842"/>
+          <a:stretch/>
+        </p:blipFill>
+        <p:spPr bwMode="auto">
+          <a:xfrm>
+            <a:off x="2438400" y="3346603"/>
+            <a:ext cx="3505200" cy="2752572"/>
+          </a:xfrm>
+          <a:prstGeom prst="rect">
+            <a:avLst/>
+          </a:prstGeom>
+          <a:noFill/>
+          <a:extLst>
+            <a:ext uri="{909E8E84-426E-40DD-AFC4-6F175D3DCCD1}">
+              <a14:hiddenFill xmlns:a14="http://schemas.microsoft.com/office/drawing/2010/main">
+                <a:solidFill>
+                  <a:srgbClr val="FFFFFF"/>
+                </a:solidFill>
+              </a14:hiddenFill>
+            </a:ext>
+          </a:extLst>
+        </p:spPr>
+      </p:pic>
+    </p:spTree>
+    <p:extLst>
+      <p:ext uri="{BB962C8B-B14F-4D97-AF65-F5344CB8AC3E}">
+        <p14:creationId xmlns:p14="http://schemas.microsoft.com/office/powerpoint/2010/main" val="1827684818"/>
+      </p:ext>
+    </p:extLst>
+  </p:cSld>
+  <p:clrMapOvr>
+    <a:masterClrMapping/>
+  </p:clrMapOvr>
+</p:sld>
+</file>
+
+<file path=ppt/slides/slide15.xml><?xml version="1.0" encoding="utf-8"?>
 <p:sld xmlns:a="http://schemas.openxmlformats.org/drawingml/2006/main" xmlns:r="http://schemas.openxmlformats.org/officeDocument/2006/relationships" xmlns:p="http://schemas.openxmlformats.org/presentationml/2006/main">
   <p:cSld>
     <p:spTree>
@@ -2496,7 +2847,7 @@
           <a:p>
             <a:r>
               <a:rPr lang="it-IT" dirty="0"/>
-              <a:t>Optimization algorithm for CARTs</a:t>
+              <a:t>Optimization algorithm</a:t>
             </a:r>
           </a:p>
           <a:p>

</xml_diff>

<commit_message>
Final modifications to old presentations committed
</commit_message>
<xml_diff>
--- a/optimization-methods-for-artificial-intelligence/ml-decision-trees-ensembles.pptx
+++ b/optimization-methods-for-artificial-intelligence/ml-decision-trees-ensembles.pptx
@@ -2672,6 +2672,34 @@
               <a:rPr lang="en-US" dirty="0"/>
               <a:t>, MIT Press, 2019</a:t>
             </a:r>
+            <a:br>
+              <a:rPr lang="en-US" dirty="0"/>
+            </a:br>
+            <a:r>
+              <a:rPr lang="en-US" dirty="0"/>
+              <a:t>- </a:t>
+            </a:r>
+            <a:r>
+              <a:rPr lang="en-US" dirty="0" err="1"/>
+              <a:t>McElfresh</a:t>
+            </a:r>
+            <a:r>
+              <a:rPr lang="en-US" dirty="0"/>
+              <a:t> et al., </a:t>
+            </a:r>
+            <a:r>
+              <a:rPr lang="en-US" i="1" dirty="0"/>
+              <a:t>When Do Neural Nets Outperform Boosted Trees on Tabular </a:t>
+            </a:r>
+            <a:r>
+              <a:rPr lang="en-US" i="1"/>
+              <a:t>Data?</a:t>
+            </a:r>
+            <a:r>
+              <a:rPr lang="en-US"/>
+              <a:t>, 2023</a:t>
+            </a:r>
+            <a:endParaRPr lang="en-US" i="1" dirty="0"/>
           </a:p>
           <a:p>
             <a:r>

</xml_diff>